<commit_message>
Julian's slides and script added
</commit_message>
<xml_diff>
--- a/OP1.pptx
+++ b/OP1.pptx
@@ -5,7 +5,7 @@
     <p:sldMasterId id="2147483672" r:id="rId1"/>
   </p:sldMasterIdLst>
   <p:notesMasterIdLst>
-    <p:notesMasterId r:id="rId8"/>
+    <p:notesMasterId r:id="rId14"/>
   </p:notesMasterIdLst>
   <p:sldIdLst>
     <p:sldId id="256" r:id="rId2"/>
@@ -14,6 +14,12 @@
     <p:sldId id="260" r:id="rId5"/>
     <p:sldId id="261" r:id="rId6"/>
     <p:sldId id="264" r:id="rId7"/>
+    <p:sldId id="270" r:id="rId8"/>
+    <p:sldId id="266" r:id="rId9"/>
+    <p:sldId id="271" r:id="rId10"/>
+    <p:sldId id="274" r:id="rId11"/>
+    <p:sldId id="272" r:id="rId12"/>
+    <p:sldId id="273" r:id="rId13"/>
   </p:sldIdLst>
   <p:sldSz cx="9144000" cy="6858000" type="screen4x3"/>
   <p:notesSz cx="6858000" cy="9144000"/>
@@ -112,6 +118,11 @@
       </a:defRPr>
     </a:lvl9pPr>
   </p:defaultTextStyle>
+  <p:extLst>
+    <p:ext uri="{EFAFB233-063F-42B5-8137-9DF3F51BA10A}">
+      <p15:sldGuideLst xmlns:p15="http://schemas.microsoft.com/office/powerpoint/2012/main"/>
+    </p:ext>
+  </p:extLst>
 </p:presentation>
 </file>
 
@@ -1086,6 +1097,13 @@
         </dgm:presLayoutVars>
       </dgm:prSet>
       <dgm:spPr/>
+      <dgm:t>
+        <a:bodyPr/>
+        <a:lstStyle/>
+        <a:p>
+          <a:endParaRPr lang="en-SG"/>
+        </a:p>
+      </dgm:t>
     </dgm:pt>
     <dgm:pt modelId="{350D9479-FFC7-4736-A641-B6D5E04A9C5A}" type="pres">
       <dgm:prSet presAssocID="{D1D1DB4A-1CCF-460B-AD5A-7F88C99B522B}" presName="node" presStyleLbl="node1" presStyleIdx="0" presStyleCnt="2">
@@ -1105,10 +1123,24 @@
     <dgm:pt modelId="{59414FDD-6E53-4AA7-ADBC-7DB3CB8F5641}" type="pres">
       <dgm:prSet presAssocID="{9FDCCEFF-D31E-46B6-9884-FAE1914A8E23}" presName="sibTrans" presStyleLbl="sibTrans2D1" presStyleIdx="0" presStyleCnt="2"/>
       <dgm:spPr/>
+      <dgm:t>
+        <a:bodyPr/>
+        <a:lstStyle/>
+        <a:p>
+          <a:endParaRPr lang="en-SG"/>
+        </a:p>
+      </dgm:t>
     </dgm:pt>
     <dgm:pt modelId="{F57151D9-1488-4268-89B5-6D7F96C0E8AD}" type="pres">
       <dgm:prSet presAssocID="{9FDCCEFF-D31E-46B6-9884-FAE1914A8E23}" presName="connectorText" presStyleLbl="sibTrans2D1" presStyleIdx="0" presStyleCnt="2"/>
       <dgm:spPr/>
+      <dgm:t>
+        <a:bodyPr/>
+        <a:lstStyle/>
+        <a:p>
+          <a:endParaRPr lang="en-SG"/>
+        </a:p>
+      </dgm:t>
     </dgm:pt>
     <dgm:pt modelId="{6CFA1C3B-E764-4C89-906C-A36ED7812F12}" type="pres">
       <dgm:prSet presAssocID="{CE002853-9EE0-4977-827E-D4A6FB364835}" presName="node" presStyleLbl="node1" presStyleIdx="1" presStyleCnt="2" custRadScaleRad="139389" custRadScaleInc="-3319">
@@ -1117,26 +1149,47 @@
         </dgm:presLayoutVars>
       </dgm:prSet>
       <dgm:spPr/>
+      <dgm:t>
+        <a:bodyPr/>
+        <a:lstStyle/>
+        <a:p>
+          <a:endParaRPr lang="en-SG"/>
+        </a:p>
+      </dgm:t>
     </dgm:pt>
     <dgm:pt modelId="{54E05733-59C2-46D4-AEE7-15F904075BA9}" type="pres">
       <dgm:prSet presAssocID="{BA94F0C7-8DEA-415A-A99A-61B17B9357AD}" presName="sibTrans" presStyleLbl="sibTrans2D1" presStyleIdx="1" presStyleCnt="2"/>
       <dgm:spPr/>
+      <dgm:t>
+        <a:bodyPr/>
+        <a:lstStyle/>
+        <a:p>
+          <a:endParaRPr lang="en-SG"/>
+        </a:p>
+      </dgm:t>
     </dgm:pt>
     <dgm:pt modelId="{0762A9D1-028E-4A58-81D8-095D29F1EB65}" type="pres">
       <dgm:prSet presAssocID="{BA94F0C7-8DEA-415A-A99A-61B17B9357AD}" presName="connectorText" presStyleLbl="sibTrans2D1" presStyleIdx="1" presStyleCnt="2"/>
       <dgm:spPr/>
+      <dgm:t>
+        <a:bodyPr/>
+        <a:lstStyle/>
+        <a:p>
+          <a:endParaRPr lang="en-SG"/>
+        </a:p>
+      </dgm:t>
     </dgm:pt>
   </dgm:ptLst>
   <dgm:cxnLst>
     <dgm:cxn modelId="{ECEBF4ED-0D18-4885-8F7C-7B453F7482D8}" type="presOf" srcId="{9FDCCEFF-D31E-46B6-9884-FAE1914A8E23}" destId="{F57151D9-1488-4268-89B5-6D7F96C0E8AD}" srcOrd="1" destOrd="0" presId="urn:microsoft.com/office/officeart/2005/8/layout/cycle2"/>
+    <dgm:cxn modelId="{E19D337C-C287-427D-BD71-D194A82901DC}" srcId="{F611EF28-A26A-47A5-B4DB-6E6AAD91E543}" destId="{D1D1DB4A-1CCF-460B-AD5A-7F88C99B522B}" srcOrd="0" destOrd="0" parTransId="{984AFDBD-385E-4D3E-8BA6-C70298650B85}" sibTransId="{9FDCCEFF-D31E-46B6-9884-FAE1914A8E23}"/>
+    <dgm:cxn modelId="{0069B75A-F70E-4449-9206-0FDA23528216}" srcId="{F611EF28-A26A-47A5-B4DB-6E6AAD91E543}" destId="{CE002853-9EE0-4977-827E-D4A6FB364835}" srcOrd="1" destOrd="0" parTransId="{FB930A7B-D311-4E82-9A7A-421756BDDD65}" sibTransId="{BA94F0C7-8DEA-415A-A99A-61B17B9357AD}"/>
+    <dgm:cxn modelId="{A4C40FC1-5C58-4CF7-96DF-9BFF29FA60CB}" type="presOf" srcId="{9FDCCEFF-D31E-46B6-9884-FAE1914A8E23}" destId="{59414FDD-6E53-4AA7-ADBC-7DB3CB8F5641}" srcOrd="0" destOrd="0" presId="urn:microsoft.com/office/officeart/2005/8/layout/cycle2"/>
+    <dgm:cxn modelId="{EE74E449-4C86-4E63-ACAC-EF02C9C38D05}" type="presOf" srcId="{BA94F0C7-8DEA-415A-A99A-61B17B9357AD}" destId="{0762A9D1-028E-4A58-81D8-095D29F1EB65}" srcOrd="1" destOrd="0" presId="urn:microsoft.com/office/officeart/2005/8/layout/cycle2"/>
+    <dgm:cxn modelId="{F0A5D3A2-6643-4924-A01B-C5BC5EC5391D}" type="presOf" srcId="{F611EF28-A26A-47A5-B4DB-6E6AAD91E543}" destId="{E553F08C-D474-4338-B0B8-0A3028AD0127}" srcOrd="0" destOrd="0" presId="urn:microsoft.com/office/officeart/2005/8/layout/cycle2"/>
+    <dgm:cxn modelId="{053A9002-4FFD-4230-A51E-4C1C225CA917}" type="presOf" srcId="{BA94F0C7-8DEA-415A-A99A-61B17B9357AD}" destId="{54E05733-59C2-46D4-AEE7-15F904075BA9}" srcOrd="0" destOrd="0" presId="urn:microsoft.com/office/officeart/2005/8/layout/cycle2"/>
     <dgm:cxn modelId="{28D23BEF-527A-40BA-9F5B-B3511FDA66D4}" type="presOf" srcId="{D1D1DB4A-1CCF-460B-AD5A-7F88C99B522B}" destId="{350D9479-FFC7-4736-A641-B6D5E04A9C5A}" srcOrd="0" destOrd="0" presId="urn:microsoft.com/office/officeart/2005/8/layout/cycle2"/>
-    <dgm:cxn modelId="{053A9002-4FFD-4230-A51E-4C1C225CA917}" type="presOf" srcId="{BA94F0C7-8DEA-415A-A99A-61B17B9357AD}" destId="{54E05733-59C2-46D4-AEE7-15F904075BA9}" srcOrd="0" destOrd="0" presId="urn:microsoft.com/office/officeart/2005/8/layout/cycle2"/>
-    <dgm:cxn modelId="{A4C40FC1-5C58-4CF7-96DF-9BFF29FA60CB}" type="presOf" srcId="{9FDCCEFF-D31E-46B6-9884-FAE1914A8E23}" destId="{59414FDD-6E53-4AA7-ADBC-7DB3CB8F5641}" srcOrd="0" destOrd="0" presId="urn:microsoft.com/office/officeart/2005/8/layout/cycle2"/>
-    <dgm:cxn modelId="{E19D337C-C287-427D-BD71-D194A82901DC}" srcId="{F611EF28-A26A-47A5-B4DB-6E6AAD91E543}" destId="{D1D1DB4A-1CCF-460B-AD5A-7F88C99B522B}" srcOrd="0" destOrd="0" parTransId="{984AFDBD-385E-4D3E-8BA6-C70298650B85}" sibTransId="{9FDCCEFF-D31E-46B6-9884-FAE1914A8E23}"/>
-    <dgm:cxn modelId="{EE74E449-4C86-4E63-ACAC-EF02C9C38D05}" type="presOf" srcId="{BA94F0C7-8DEA-415A-A99A-61B17B9357AD}" destId="{0762A9D1-028E-4A58-81D8-095D29F1EB65}" srcOrd="1" destOrd="0" presId="urn:microsoft.com/office/officeart/2005/8/layout/cycle2"/>
-    <dgm:cxn modelId="{0069B75A-F70E-4449-9206-0FDA23528216}" srcId="{F611EF28-A26A-47A5-B4DB-6E6AAD91E543}" destId="{CE002853-9EE0-4977-827E-D4A6FB364835}" srcOrd="1" destOrd="0" parTransId="{FB930A7B-D311-4E82-9A7A-421756BDDD65}" sibTransId="{BA94F0C7-8DEA-415A-A99A-61B17B9357AD}"/>
     <dgm:cxn modelId="{4C67A1D7-43B2-40B9-8C8B-ACFE6C8C0F64}" type="presOf" srcId="{CE002853-9EE0-4977-827E-D4A6FB364835}" destId="{6CFA1C3B-E764-4C89-906C-A36ED7812F12}" srcOrd="0" destOrd="0" presId="urn:microsoft.com/office/officeart/2005/8/layout/cycle2"/>
-    <dgm:cxn modelId="{F0A5D3A2-6643-4924-A01B-C5BC5EC5391D}" type="presOf" srcId="{F611EF28-A26A-47A5-B4DB-6E6AAD91E543}" destId="{E553F08C-D474-4338-B0B8-0A3028AD0127}" srcOrd="0" destOrd="0" presId="urn:microsoft.com/office/officeart/2005/8/layout/cycle2"/>
     <dgm:cxn modelId="{C637B5D1-E0D9-4254-9A6F-6DA05154AEDD}" type="presParOf" srcId="{E553F08C-D474-4338-B0B8-0A3028AD0127}" destId="{350D9479-FFC7-4736-A641-B6D5E04A9C5A}" srcOrd="0" destOrd="0" presId="urn:microsoft.com/office/officeart/2005/8/layout/cycle2"/>
     <dgm:cxn modelId="{914203E2-D19E-46C5-BA71-52797C4ED800}" type="presParOf" srcId="{E553F08C-D474-4338-B0B8-0A3028AD0127}" destId="{59414FDD-6E53-4AA7-ADBC-7DB3CB8F5641}" srcOrd="1" destOrd="0" presId="urn:microsoft.com/office/officeart/2005/8/layout/cycle2"/>
     <dgm:cxn modelId="{B6FDBC25-E729-4ECF-81EA-D2A6DE0C07CB}" type="presParOf" srcId="{59414FDD-6E53-4AA7-ADBC-7DB3CB8F5641}" destId="{F57151D9-1488-4268-89B5-6D7F96C0E8AD}" srcOrd="0" destOrd="0" presId="urn:microsoft.com/office/officeart/2005/8/layout/cycle2"/>
@@ -2787,7 +2840,7 @@
           <a:p>
             <a:fld id="{C84430E2-E71A-4A01-8927-D9FFBBA4F669}" type="datetimeFigureOut">
               <a:rPr lang="zh-SG" altLang="en-US" smtClean="0"/>
-              <a:t>29/1/2016</a:t>
+              <a:t>31/1/2016</a:t>
             </a:fld>
             <a:endParaRPr lang="zh-SG" altLang="en-US"/>
           </a:p>
@@ -3114,7 +3167,15 @@
           <a:p>
             <a:r>
               <a:rPr lang="en-US" altLang="zh-SG" baseline="0" dirty="0" smtClean="0"/>
-              <a:t>Manage of body movement is essentially the management of our mind state.</a:t>
+              <a:t>Manage of body movement is essentially the management </a:t>
+            </a:r>
+            <a:r>
+              <a:rPr lang="en-US" altLang="zh-SG" baseline="0" dirty="0" smtClean="0"/>
+              <a:t>of </a:t>
+            </a:r>
+            <a:r>
+              <a:rPr lang="en-US" altLang="zh-SG" baseline="0" dirty="0" smtClean="0"/>
+              <a:t>our mind state.</a:t>
             </a:r>
           </a:p>
           <a:p>
@@ -3429,6 +3490,745 @@
     <p:extLst>
       <p:ext uri="{BB962C8B-B14F-4D97-AF65-F5344CB8AC3E}">
         <p14:creationId xmlns:p14="http://schemas.microsoft.com/office/powerpoint/2010/main" val="231934490"/>
+      </p:ext>
+    </p:extLst>
+  </p:cSld>
+  <p:clrMapOvr>
+    <a:masterClrMapping/>
+  </p:clrMapOvr>
+</p:notes>
+</file>
+
+<file path=ppt/notesSlides/notesSlide4.xml><?xml version="1.0" encoding="utf-8"?>
+<p:notes xmlns:a="http://schemas.openxmlformats.org/drawingml/2006/main" xmlns:r="http://schemas.openxmlformats.org/officeDocument/2006/relationships" xmlns:p="http://schemas.openxmlformats.org/presentationml/2006/main">
+  <p:cSld>
+    <p:spTree>
+      <p:nvGrpSpPr>
+        <p:cNvPr id="1" name=""/>
+        <p:cNvGrpSpPr/>
+        <p:nvPr/>
+      </p:nvGrpSpPr>
+      <p:grpSpPr>
+        <a:xfrm>
+          <a:off x="0" y="0"/>
+          <a:ext cx="0" cy="0"/>
+          <a:chOff x="0" y="0"/>
+          <a:chExt cx="0" cy="0"/>
+        </a:xfrm>
+      </p:grpSpPr>
+      <p:sp>
+        <p:nvSpPr>
+          <p:cNvPr id="2" name="Slide Image Placeholder 1"/>
+          <p:cNvSpPr>
+            <a:spLocks noGrp="1" noRot="1" noChangeAspect="1"/>
+          </p:cNvSpPr>
+          <p:nvPr>
+            <p:ph type="sldImg"/>
+          </p:nvPr>
+        </p:nvSpPr>
+        <p:spPr/>
+      </p:sp>
+      <p:sp>
+        <p:nvSpPr>
+          <p:cNvPr id="3" name="Notes Placeholder 2"/>
+          <p:cNvSpPr>
+            <a:spLocks noGrp="1"/>
+          </p:cNvSpPr>
+          <p:nvPr>
+            <p:ph type="body" idx="1"/>
+          </p:nvPr>
+        </p:nvSpPr>
+        <p:spPr/>
+        <p:txBody>
+          <a:bodyPr/>
+          <a:lstStyle/>
+          <a:p>
+            <a:r>
+              <a:rPr lang="en-SG" dirty="0" smtClean="0"/>
+              <a:t>Don't answer vague questions. Rather than answering questions you think you hear, get the employer to be more specific and then respond.</a:t>
+            </a:r>
+          </a:p>
+          <a:p>
+            <a:r>
+              <a:rPr lang="en-SG" dirty="0" smtClean="0"/>
+              <a:t>Answering</a:t>
+            </a:r>
+            <a:r>
+              <a:rPr lang="en-SG" baseline="0" dirty="0" smtClean="0"/>
+              <a:t> vague questions only create opportunities for you to potentially blurt out something totally irrelevant.</a:t>
+            </a:r>
+          </a:p>
+          <a:p>
+            <a:r>
+              <a:rPr lang="en-SG" baseline="0" dirty="0" smtClean="0"/>
+              <a:t>In the best scenario, you answer the question accurately, in the worst, you create a bad impression for yourself. </a:t>
+            </a:r>
+            <a:endParaRPr lang="en-SG" dirty="0" smtClean="0"/>
+          </a:p>
+        </p:txBody>
+      </p:sp>
+      <p:sp>
+        <p:nvSpPr>
+          <p:cNvPr id="4" name="Slide Number Placeholder 3"/>
+          <p:cNvSpPr>
+            <a:spLocks noGrp="1"/>
+          </p:cNvSpPr>
+          <p:nvPr>
+            <p:ph type="sldNum" sz="quarter" idx="10"/>
+          </p:nvPr>
+        </p:nvSpPr>
+        <p:spPr/>
+        <p:txBody>
+          <a:bodyPr/>
+          <a:lstStyle/>
+          <a:p>
+            <a:fld id="{5501EC1D-0087-4192-9EEB-BFDFC93C89F6}" type="slidenum">
+              <a:rPr lang="zh-SG" altLang="en-US" smtClean="0"/>
+              <a:t>8</a:t>
+            </a:fld>
+            <a:endParaRPr lang="zh-SG" altLang="en-US"/>
+          </a:p>
+        </p:txBody>
+      </p:sp>
+    </p:spTree>
+    <p:extLst>
+      <p:ext uri="{BB962C8B-B14F-4D97-AF65-F5344CB8AC3E}">
+        <p14:creationId xmlns:p14="http://schemas.microsoft.com/office/powerpoint/2010/main" val="3252761126"/>
+      </p:ext>
+    </p:extLst>
+  </p:cSld>
+  <p:clrMapOvr>
+    <a:masterClrMapping/>
+  </p:clrMapOvr>
+</p:notes>
+</file>
+
+<file path=ppt/notesSlides/notesSlide5.xml><?xml version="1.0" encoding="utf-8"?>
+<p:notes xmlns:a="http://schemas.openxmlformats.org/drawingml/2006/main" xmlns:r="http://schemas.openxmlformats.org/officeDocument/2006/relationships" xmlns:p="http://schemas.openxmlformats.org/presentationml/2006/main">
+  <p:cSld>
+    <p:spTree>
+      <p:nvGrpSpPr>
+        <p:cNvPr id="1" name=""/>
+        <p:cNvGrpSpPr/>
+        <p:nvPr/>
+      </p:nvGrpSpPr>
+      <p:grpSpPr>
+        <a:xfrm>
+          <a:off x="0" y="0"/>
+          <a:ext cx="0" cy="0"/>
+          <a:chOff x="0" y="0"/>
+          <a:chExt cx="0" cy="0"/>
+        </a:xfrm>
+      </p:grpSpPr>
+      <p:sp>
+        <p:nvSpPr>
+          <p:cNvPr id="2" name="Slide Image Placeholder 1"/>
+          <p:cNvSpPr>
+            <a:spLocks noGrp="1" noRot="1" noChangeAspect="1"/>
+          </p:cNvSpPr>
+          <p:nvPr>
+            <p:ph type="sldImg"/>
+          </p:nvPr>
+        </p:nvSpPr>
+        <p:spPr/>
+      </p:sp>
+      <p:sp>
+        <p:nvSpPr>
+          <p:cNvPr id="3" name="Notes Placeholder 2"/>
+          <p:cNvSpPr>
+            <a:spLocks noGrp="1"/>
+          </p:cNvSpPr>
+          <p:nvPr>
+            <p:ph type="body" idx="1"/>
+          </p:nvPr>
+        </p:nvSpPr>
+        <p:spPr/>
+        <p:txBody>
+          <a:bodyPr/>
+          <a:lstStyle/>
+          <a:p>
+            <a:pPr marL="0" marR="0" indent="0" algn="l" defTabSz="914400" rtl="0" eaLnBrk="1" fontAlgn="auto" latinLnBrk="0" hangingPunct="1">
+              <a:lnSpc>
+                <a:spcPct val="100000"/>
+              </a:lnSpc>
+              <a:spcBef>
+                <a:spcPts val="0"/>
+              </a:spcBef>
+              <a:spcAft>
+                <a:spcPts val="0"/>
+              </a:spcAft>
+              <a:buClrTx/>
+              <a:buSzTx/>
+              <a:buFontTx/>
+              <a:buNone/>
+              <a:tabLst/>
+              <a:defRPr/>
+            </a:pPr>
+            <a:r>
+              <a:rPr lang="en-SG" dirty="0" smtClean="0"/>
+              <a:t>Never interrupt the employer. If you don't have time to listen, neither does the employer</a:t>
+            </a:r>
+            <a:r>
+              <a:rPr lang="en-SG" baseline="0" dirty="0" smtClean="0"/>
+              <a:t> have time to listen to you.</a:t>
+            </a:r>
+          </a:p>
+          <a:p>
+            <a:pPr marL="0" marR="0" indent="0" algn="l" defTabSz="914400" rtl="0" eaLnBrk="1" fontAlgn="auto" latinLnBrk="0" hangingPunct="1">
+              <a:lnSpc>
+                <a:spcPct val="100000"/>
+              </a:lnSpc>
+              <a:spcBef>
+                <a:spcPts val="0"/>
+              </a:spcBef>
+              <a:spcAft>
+                <a:spcPts val="0"/>
+              </a:spcAft>
+              <a:buClrTx/>
+              <a:buSzTx/>
+              <a:buFontTx/>
+              <a:buNone/>
+              <a:tabLst/>
+              <a:defRPr/>
+            </a:pPr>
+            <a:r>
+              <a:rPr lang="en-SG" baseline="0" dirty="0" smtClean="0"/>
+              <a:t>Additionally, this can only spell out a bad working attitude from you in the future if the employer chooses to hire you.</a:t>
+            </a:r>
+          </a:p>
+          <a:p>
+            <a:pPr marL="0" marR="0" indent="0" algn="l" defTabSz="914400" rtl="0" eaLnBrk="1" fontAlgn="auto" latinLnBrk="0" hangingPunct="1">
+              <a:lnSpc>
+                <a:spcPct val="100000"/>
+              </a:lnSpc>
+              <a:spcBef>
+                <a:spcPts val="0"/>
+              </a:spcBef>
+              <a:spcAft>
+                <a:spcPts val="0"/>
+              </a:spcAft>
+              <a:buClrTx/>
+              <a:buSzTx/>
+              <a:buFontTx/>
+              <a:buNone/>
+              <a:tabLst/>
+              <a:defRPr/>
+            </a:pPr>
+            <a:r>
+              <a:rPr lang="en-SG" baseline="0" dirty="0" smtClean="0"/>
+              <a:t>This will lead him or her to reconsider whether to give you the job.</a:t>
+            </a:r>
+            <a:r>
+              <a:rPr lang="en-SG" sz="1200" b="1" i="0" u="sng" kern="1200" dirty="0" smtClean="0">
+                <a:solidFill>
+                  <a:schemeClr val="tx1"/>
+                </a:solidFill>
+                <a:effectLst/>
+                <a:latin typeface="+mn-lt"/>
+                <a:ea typeface="+mn-ea"/>
+                <a:cs typeface="+mn-cs"/>
+              </a:rPr>
+              <a:t> </a:t>
+            </a:r>
+            <a:endParaRPr lang="en-SG" dirty="0" smtClean="0"/>
+          </a:p>
+        </p:txBody>
+      </p:sp>
+      <p:sp>
+        <p:nvSpPr>
+          <p:cNvPr id="4" name="Slide Number Placeholder 3"/>
+          <p:cNvSpPr>
+            <a:spLocks noGrp="1"/>
+          </p:cNvSpPr>
+          <p:nvPr>
+            <p:ph type="sldNum" sz="quarter" idx="10"/>
+          </p:nvPr>
+        </p:nvSpPr>
+        <p:spPr/>
+        <p:txBody>
+          <a:bodyPr/>
+          <a:lstStyle/>
+          <a:p>
+            <a:fld id="{5501EC1D-0087-4192-9EEB-BFDFC93C89F6}" type="slidenum">
+              <a:rPr lang="zh-SG" altLang="en-US" smtClean="0"/>
+              <a:t>9</a:t>
+            </a:fld>
+            <a:endParaRPr lang="zh-SG" altLang="en-US"/>
+          </a:p>
+        </p:txBody>
+      </p:sp>
+    </p:spTree>
+    <p:extLst>
+      <p:ext uri="{BB962C8B-B14F-4D97-AF65-F5344CB8AC3E}">
+        <p14:creationId xmlns:p14="http://schemas.microsoft.com/office/powerpoint/2010/main" val="2185945199"/>
+      </p:ext>
+    </p:extLst>
+  </p:cSld>
+  <p:clrMapOvr>
+    <a:masterClrMapping/>
+  </p:clrMapOvr>
+</p:notes>
+</file>
+
+<file path=ppt/notesSlides/notesSlide6.xml><?xml version="1.0" encoding="utf-8"?>
+<p:notes xmlns:a="http://schemas.openxmlformats.org/drawingml/2006/main" xmlns:r="http://schemas.openxmlformats.org/officeDocument/2006/relationships" xmlns:p="http://schemas.openxmlformats.org/presentationml/2006/main">
+  <p:cSld>
+    <p:spTree>
+      <p:nvGrpSpPr>
+        <p:cNvPr id="1" name=""/>
+        <p:cNvGrpSpPr/>
+        <p:nvPr/>
+      </p:nvGrpSpPr>
+      <p:grpSpPr>
+        <a:xfrm>
+          <a:off x="0" y="0"/>
+          <a:ext cx="0" cy="0"/>
+          <a:chOff x="0" y="0"/>
+          <a:chExt cx="0" cy="0"/>
+        </a:xfrm>
+      </p:grpSpPr>
+      <p:sp>
+        <p:nvSpPr>
+          <p:cNvPr id="2" name="Slide Image Placeholder 1"/>
+          <p:cNvSpPr>
+            <a:spLocks noGrp="1" noRot="1" noChangeAspect="1"/>
+          </p:cNvSpPr>
+          <p:nvPr>
+            <p:ph type="sldImg"/>
+          </p:nvPr>
+        </p:nvSpPr>
+        <p:spPr/>
+      </p:sp>
+      <p:sp>
+        <p:nvSpPr>
+          <p:cNvPr id="3" name="Notes Placeholder 2"/>
+          <p:cNvSpPr>
+            <a:spLocks noGrp="1"/>
+          </p:cNvSpPr>
+          <p:nvPr>
+            <p:ph type="body" idx="1"/>
+          </p:nvPr>
+        </p:nvSpPr>
+        <p:spPr/>
+        <p:txBody>
+          <a:bodyPr/>
+          <a:lstStyle/>
+          <a:p>
+            <a:pPr marL="0" marR="0" indent="0" algn="l" defTabSz="914400" rtl="0" eaLnBrk="1" fontAlgn="auto" latinLnBrk="0" hangingPunct="1">
+              <a:lnSpc>
+                <a:spcPct val="100000"/>
+              </a:lnSpc>
+              <a:spcBef>
+                <a:spcPts val="0"/>
+              </a:spcBef>
+              <a:spcAft>
+                <a:spcPts val="0"/>
+              </a:spcAft>
+              <a:buClrTx/>
+              <a:buSzTx/>
+              <a:buFontTx/>
+              <a:buNone/>
+              <a:tabLst/>
+              <a:defRPr/>
+            </a:pPr>
+            <a:r>
+              <a:rPr lang="en-SG" dirty="0" smtClean="0"/>
+              <a:t>Do not make</a:t>
+            </a:r>
+            <a:r>
+              <a:rPr lang="en-SG" baseline="0" dirty="0" smtClean="0"/>
+              <a:t> derogatory comments about </a:t>
+            </a:r>
+            <a:r>
+              <a:rPr lang="en-SG" sz="1200" b="0" i="0" kern="1200" dirty="0" smtClean="0">
+                <a:solidFill>
+                  <a:schemeClr val="tx1"/>
+                </a:solidFill>
+                <a:effectLst/>
+                <a:latin typeface="+mn-lt"/>
+                <a:ea typeface="+mn-ea"/>
+                <a:cs typeface="+mn-cs"/>
+              </a:rPr>
+              <a:t>your present or former employers, colleagues or companies.</a:t>
+            </a:r>
+          </a:p>
+          <a:p>
+            <a:pPr marL="0" marR="0" indent="0" algn="l" defTabSz="914400" rtl="0" eaLnBrk="1" fontAlgn="auto" latinLnBrk="0" hangingPunct="1">
+              <a:lnSpc>
+                <a:spcPct val="100000"/>
+              </a:lnSpc>
+              <a:spcBef>
+                <a:spcPts val="0"/>
+              </a:spcBef>
+              <a:spcAft>
+                <a:spcPts val="0"/>
+              </a:spcAft>
+              <a:buClrTx/>
+              <a:buSzTx/>
+              <a:buFontTx/>
+              <a:buNone/>
+              <a:tabLst/>
+              <a:defRPr/>
+            </a:pPr>
+            <a:r>
+              <a:rPr lang="en-SG" sz="1200" b="0" i="0" kern="1200" baseline="0" dirty="0" smtClean="0">
+                <a:solidFill>
+                  <a:schemeClr val="tx1"/>
+                </a:solidFill>
+                <a:effectLst/>
+                <a:latin typeface="+mn-lt"/>
+                <a:ea typeface="+mn-ea"/>
+                <a:cs typeface="+mn-cs"/>
+              </a:rPr>
+              <a:t>This does not bring reflect good on you as it only portrays you as someone who is not a team player or a good subordinate.</a:t>
+            </a:r>
+          </a:p>
+          <a:p>
+            <a:pPr marL="0" marR="0" indent="0" algn="l" defTabSz="914400" rtl="0" eaLnBrk="1" fontAlgn="auto" latinLnBrk="0" hangingPunct="1">
+              <a:lnSpc>
+                <a:spcPct val="100000"/>
+              </a:lnSpc>
+              <a:spcBef>
+                <a:spcPts val="0"/>
+              </a:spcBef>
+              <a:spcAft>
+                <a:spcPts val="0"/>
+              </a:spcAft>
+              <a:buClrTx/>
+              <a:buSzTx/>
+              <a:buFontTx/>
+              <a:buNone/>
+              <a:tabLst/>
+              <a:defRPr/>
+            </a:pPr>
+            <a:r>
+              <a:rPr lang="en-SG" sz="1200" b="0" i="0" kern="1200" baseline="0" dirty="0" smtClean="0">
+                <a:solidFill>
+                  <a:schemeClr val="tx1"/>
+                </a:solidFill>
+                <a:effectLst/>
+                <a:latin typeface="+mn-lt"/>
+                <a:ea typeface="+mn-ea"/>
+                <a:cs typeface="+mn-cs"/>
+              </a:rPr>
+              <a:t>Deriding your past or present work partners can make you look like a bitter person who might potentially cause unhappiness in the workplace if you join the employer’s company. This is clearly undesirable.</a:t>
+            </a:r>
+          </a:p>
+        </p:txBody>
+      </p:sp>
+      <p:sp>
+        <p:nvSpPr>
+          <p:cNvPr id="4" name="Slide Number Placeholder 3"/>
+          <p:cNvSpPr>
+            <a:spLocks noGrp="1"/>
+          </p:cNvSpPr>
+          <p:nvPr>
+            <p:ph type="sldNum" sz="quarter" idx="10"/>
+          </p:nvPr>
+        </p:nvSpPr>
+        <p:spPr/>
+        <p:txBody>
+          <a:bodyPr/>
+          <a:lstStyle/>
+          <a:p>
+            <a:fld id="{5501EC1D-0087-4192-9EEB-BFDFC93C89F6}" type="slidenum">
+              <a:rPr lang="zh-SG" altLang="en-US" smtClean="0"/>
+              <a:t>10</a:t>
+            </a:fld>
+            <a:endParaRPr lang="zh-SG" altLang="en-US"/>
+          </a:p>
+        </p:txBody>
+      </p:sp>
+    </p:spTree>
+    <p:extLst>
+      <p:ext uri="{BB962C8B-B14F-4D97-AF65-F5344CB8AC3E}">
+        <p14:creationId xmlns:p14="http://schemas.microsoft.com/office/powerpoint/2010/main" val="2006720566"/>
+      </p:ext>
+    </p:extLst>
+  </p:cSld>
+  <p:clrMapOvr>
+    <a:masterClrMapping/>
+  </p:clrMapOvr>
+</p:notes>
+</file>
+
+<file path=ppt/notesSlides/notesSlide7.xml><?xml version="1.0" encoding="utf-8"?>
+<p:notes xmlns:a="http://schemas.openxmlformats.org/drawingml/2006/main" xmlns:r="http://schemas.openxmlformats.org/officeDocument/2006/relationships" xmlns:p="http://schemas.openxmlformats.org/presentationml/2006/main">
+  <p:cSld>
+    <p:spTree>
+      <p:nvGrpSpPr>
+        <p:cNvPr id="1" name=""/>
+        <p:cNvGrpSpPr/>
+        <p:nvPr/>
+      </p:nvGrpSpPr>
+      <p:grpSpPr>
+        <a:xfrm>
+          <a:off x="0" y="0"/>
+          <a:ext cx="0" cy="0"/>
+          <a:chOff x="0" y="0"/>
+          <a:chExt cx="0" cy="0"/>
+        </a:xfrm>
+      </p:grpSpPr>
+      <p:sp>
+        <p:nvSpPr>
+          <p:cNvPr id="2" name="Slide Image Placeholder 1"/>
+          <p:cNvSpPr>
+            <a:spLocks noGrp="1" noRot="1" noChangeAspect="1"/>
+          </p:cNvSpPr>
+          <p:nvPr>
+            <p:ph type="sldImg"/>
+          </p:nvPr>
+        </p:nvSpPr>
+        <p:spPr/>
+      </p:sp>
+      <p:sp>
+        <p:nvSpPr>
+          <p:cNvPr id="3" name="Notes Placeholder 2"/>
+          <p:cNvSpPr>
+            <a:spLocks noGrp="1"/>
+          </p:cNvSpPr>
+          <p:nvPr>
+            <p:ph type="body" idx="1"/>
+          </p:nvPr>
+        </p:nvSpPr>
+        <p:spPr/>
+        <p:txBody>
+          <a:bodyPr/>
+          <a:lstStyle/>
+          <a:p>
+            <a:pPr marL="0" marR="0" indent="0" algn="l" defTabSz="914400" rtl="0" eaLnBrk="1" fontAlgn="auto" latinLnBrk="0" hangingPunct="1">
+              <a:lnSpc>
+                <a:spcPct val="100000"/>
+              </a:lnSpc>
+              <a:spcBef>
+                <a:spcPts val="0"/>
+              </a:spcBef>
+              <a:spcAft>
+                <a:spcPts val="0"/>
+              </a:spcAft>
+              <a:buClrTx/>
+              <a:buSzTx/>
+              <a:buFontTx/>
+              <a:buNone/>
+              <a:tabLst/>
+              <a:defRPr/>
+            </a:pPr>
+            <a:r>
+              <a:rPr lang="en-SG" dirty="0" smtClean="0"/>
+              <a:t>Eating</a:t>
+            </a:r>
+            <a:r>
+              <a:rPr lang="en-SG" baseline="0" dirty="0" smtClean="0"/>
+              <a:t> food in almost any interview is a big no-no.</a:t>
+            </a:r>
+          </a:p>
+          <a:p>
+            <a:pPr marL="0" marR="0" indent="0" algn="l" defTabSz="914400" rtl="0" eaLnBrk="1" fontAlgn="auto" latinLnBrk="0" hangingPunct="1">
+              <a:lnSpc>
+                <a:spcPct val="100000"/>
+              </a:lnSpc>
+              <a:spcBef>
+                <a:spcPts val="0"/>
+              </a:spcBef>
+              <a:spcAft>
+                <a:spcPts val="0"/>
+              </a:spcAft>
+              <a:buClrTx/>
+              <a:buSzTx/>
+              <a:buFontTx/>
+              <a:buNone/>
+              <a:tabLst/>
+              <a:defRPr/>
+            </a:pPr>
+            <a:r>
+              <a:rPr lang="en-SG" baseline="0" dirty="0" smtClean="0"/>
+              <a:t>It conveys to the employers a sloppy attitude and lack of seriousness pertaining to the interview.</a:t>
+            </a:r>
+          </a:p>
+          <a:p>
+            <a:pPr marL="0" marR="0" indent="0" algn="l" defTabSz="914400" rtl="0" eaLnBrk="1" fontAlgn="auto" latinLnBrk="0" hangingPunct="1">
+              <a:lnSpc>
+                <a:spcPct val="100000"/>
+              </a:lnSpc>
+              <a:spcBef>
+                <a:spcPts val="0"/>
+              </a:spcBef>
+              <a:spcAft>
+                <a:spcPts val="0"/>
+              </a:spcAft>
+              <a:buClrTx/>
+              <a:buSzTx/>
+              <a:buFontTx/>
+              <a:buNone/>
+              <a:tabLst/>
+              <a:defRPr/>
+            </a:pPr>
+            <a:r>
+              <a:rPr lang="en-SG" baseline="0" dirty="0" smtClean="0"/>
+              <a:t>Additionally it can be off-putting if you are talking and there is food in your mouth.</a:t>
+            </a:r>
+            <a:endParaRPr lang="en-SG" dirty="0" smtClean="0"/>
+          </a:p>
+        </p:txBody>
+      </p:sp>
+      <p:sp>
+        <p:nvSpPr>
+          <p:cNvPr id="4" name="Slide Number Placeholder 3"/>
+          <p:cNvSpPr>
+            <a:spLocks noGrp="1"/>
+          </p:cNvSpPr>
+          <p:nvPr>
+            <p:ph type="sldNum" sz="quarter" idx="10"/>
+          </p:nvPr>
+        </p:nvSpPr>
+        <p:spPr/>
+        <p:txBody>
+          <a:bodyPr/>
+          <a:lstStyle/>
+          <a:p>
+            <a:fld id="{5501EC1D-0087-4192-9EEB-BFDFC93C89F6}" type="slidenum">
+              <a:rPr lang="zh-SG" altLang="en-US" smtClean="0"/>
+              <a:t>11</a:t>
+            </a:fld>
+            <a:endParaRPr lang="zh-SG" altLang="en-US"/>
+          </a:p>
+        </p:txBody>
+      </p:sp>
+    </p:spTree>
+    <p:extLst>
+      <p:ext uri="{BB962C8B-B14F-4D97-AF65-F5344CB8AC3E}">
+        <p14:creationId xmlns:p14="http://schemas.microsoft.com/office/powerpoint/2010/main" val="2597773943"/>
+      </p:ext>
+    </p:extLst>
+  </p:cSld>
+  <p:clrMapOvr>
+    <a:masterClrMapping/>
+  </p:clrMapOvr>
+</p:notes>
+</file>
+
+<file path=ppt/notesSlides/notesSlide8.xml><?xml version="1.0" encoding="utf-8"?>
+<p:notes xmlns:a="http://schemas.openxmlformats.org/drawingml/2006/main" xmlns:r="http://schemas.openxmlformats.org/officeDocument/2006/relationships" xmlns:p="http://schemas.openxmlformats.org/presentationml/2006/main">
+  <p:cSld>
+    <p:spTree>
+      <p:nvGrpSpPr>
+        <p:cNvPr id="1" name=""/>
+        <p:cNvGrpSpPr/>
+        <p:nvPr/>
+      </p:nvGrpSpPr>
+      <p:grpSpPr>
+        <a:xfrm>
+          <a:off x="0" y="0"/>
+          <a:ext cx="0" cy="0"/>
+          <a:chOff x="0" y="0"/>
+          <a:chExt cx="0" cy="0"/>
+        </a:xfrm>
+      </p:grpSpPr>
+      <p:sp>
+        <p:nvSpPr>
+          <p:cNvPr id="2" name="Slide Image Placeholder 1"/>
+          <p:cNvSpPr>
+            <a:spLocks noGrp="1" noRot="1" noChangeAspect="1"/>
+          </p:cNvSpPr>
+          <p:nvPr>
+            <p:ph type="sldImg"/>
+          </p:nvPr>
+        </p:nvSpPr>
+        <p:spPr/>
+      </p:sp>
+      <p:sp>
+        <p:nvSpPr>
+          <p:cNvPr id="3" name="Notes Placeholder 2"/>
+          <p:cNvSpPr>
+            <a:spLocks noGrp="1"/>
+          </p:cNvSpPr>
+          <p:nvPr>
+            <p:ph type="body" idx="1"/>
+          </p:nvPr>
+        </p:nvSpPr>
+        <p:spPr/>
+        <p:txBody>
+          <a:bodyPr/>
+          <a:lstStyle/>
+          <a:p>
+            <a:pPr marL="0" marR="0" indent="0" algn="l" defTabSz="914400" rtl="0" eaLnBrk="1" fontAlgn="auto" latinLnBrk="0" hangingPunct="1">
+              <a:lnSpc>
+                <a:spcPct val="100000"/>
+              </a:lnSpc>
+              <a:spcBef>
+                <a:spcPts val="0"/>
+              </a:spcBef>
+              <a:spcAft>
+                <a:spcPts val="0"/>
+              </a:spcAft>
+              <a:buClrTx/>
+              <a:buSzTx/>
+              <a:buFontTx/>
+              <a:buNone/>
+              <a:tabLst/>
+              <a:defRPr/>
+            </a:pPr>
+            <a:r>
+              <a:rPr lang="en-SG" dirty="0" smtClean="0"/>
+              <a:t>Smell</a:t>
+            </a:r>
+            <a:r>
+              <a:rPr lang="en-SG" baseline="0" dirty="0" smtClean="0"/>
+              <a:t> is a very subjective thing, and the scent that you like might not be one that your potential employer likes.</a:t>
+            </a:r>
+          </a:p>
+          <a:p>
+            <a:pPr marL="0" marR="0" indent="0" algn="l" defTabSz="914400" rtl="0" eaLnBrk="1" fontAlgn="auto" latinLnBrk="0" hangingPunct="1">
+              <a:lnSpc>
+                <a:spcPct val="100000"/>
+              </a:lnSpc>
+              <a:spcBef>
+                <a:spcPts val="0"/>
+              </a:spcBef>
+              <a:spcAft>
+                <a:spcPts val="0"/>
+              </a:spcAft>
+              <a:buClrTx/>
+              <a:buSzTx/>
+              <a:buFontTx/>
+              <a:buNone/>
+              <a:tabLst/>
+              <a:defRPr/>
+            </a:pPr>
+            <a:r>
+              <a:rPr lang="en-SG" baseline="0" dirty="0" smtClean="0"/>
+              <a:t>On top of that, wearing strong perfume or cologne distracts the employer from the interview at hand and does not help you when you are trying to promote your expertise.</a:t>
+            </a:r>
+          </a:p>
+        </p:txBody>
+      </p:sp>
+      <p:sp>
+        <p:nvSpPr>
+          <p:cNvPr id="4" name="Slide Number Placeholder 3"/>
+          <p:cNvSpPr>
+            <a:spLocks noGrp="1"/>
+          </p:cNvSpPr>
+          <p:nvPr>
+            <p:ph type="sldNum" sz="quarter" idx="10"/>
+          </p:nvPr>
+        </p:nvSpPr>
+        <p:spPr/>
+        <p:txBody>
+          <a:bodyPr/>
+          <a:lstStyle/>
+          <a:p>
+            <a:fld id="{5501EC1D-0087-4192-9EEB-BFDFC93C89F6}" type="slidenum">
+              <a:rPr lang="zh-SG" altLang="en-US" smtClean="0"/>
+              <a:t>12</a:t>
+            </a:fld>
+            <a:endParaRPr lang="zh-SG" altLang="en-US"/>
+          </a:p>
+        </p:txBody>
+      </p:sp>
+    </p:spTree>
+    <p:extLst>
+      <p:ext uri="{BB962C8B-B14F-4D97-AF65-F5344CB8AC3E}">
+        <p14:creationId xmlns:p14="http://schemas.microsoft.com/office/powerpoint/2010/main" val="4094516648"/>
       </p:ext>
     </p:extLst>
   </p:cSld>
@@ -3725,7 +4525,7 @@
           <a:p>
             <a:fld id="{CCC07F1D-6EC5-4E99-BA92-5EA217BDCEFD}" type="datetimeFigureOut">
               <a:rPr lang="zh-SG" altLang="en-US" smtClean="0"/>
-              <a:t>29/1/2016</a:t>
+              <a:t>31/1/2016</a:t>
             </a:fld>
             <a:endParaRPr lang="zh-SG" altLang="en-US"/>
           </a:p>
@@ -4043,7 +4843,7 @@
           <a:p>
             <a:fld id="{CCC07F1D-6EC5-4E99-BA92-5EA217BDCEFD}" type="datetimeFigureOut">
               <a:rPr lang="zh-SG" altLang="en-US" smtClean="0"/>
-              <a:t>29/1/2016</a:t>
+              <a:t>31/1/2016</a:t>
             </a:fld>
             <a:endParaRPr lang="zh-SG" altLang="en-US"/>
           </a:p>
@@ -4531,7 +5331,7 @@
           <a:p>
             <a:fld id="{CCC07F1D-6EC5-4E99-BA92-5EA217BDCEFD}" type="datetimeFigureOut">
               <a:rPr lang="zh-SG" altLang="en-US" smtClean="0"/>
-              <a:t>29/1/2016</a:t>
+              <a:t>31/1/2016</a:t>
             </a:fld>
             <a:endParaRPr lang="zh-SG" altLang="en-US"/>
           </a:p>
@@ -4900,7 +5700,7 @@
           <a:p>
             <a:fld id="{CCC07F1D-6EC5-4E99-BA92-5EA217BDCEFD}" type="datetimeFigureOut">
               <a:rPr lang="zh-SG" altLang="en-US" smtClean="0"/>
-              <a:t>29/1/2016</a:t>
+              <a:t>31/1/2016</a:t>
             </a:fld>
             <a:endParaRPr lang="zh-SG" altLang="en-US"/>
           </a:p>
@@ -5173,7 +5973,7 @@
           <a:p>
             <a:fld id="{CCC07F1D-6EC5-4E99-BA92-5EA217BDCEFD}" type="datetimeFigureOut">
               <a:rPr lang="zh-SG" altLang="en-US" smtClean="0"/>
-              <a:t>29/1/2016</a:t>
+              <a:t>31/1/2016</a:t>
             </a:fld>
             <a:endParaRPr lang="zh-SG" altLang="en-US"/>
           </a:p>
@@ -5499,7 +6299,7 @@
           <a:p>
             <a:fld id="{CCC07F1D-6EC5-4E99-BA92-5EA217BDCEFD}" type="datetimeFigureOut">
               <a:rPr lang="zh-SG" altLang="en-US" smtClean="0"/>
-              <a:t>29/1/2016</a:t>
+              <a:t>31/1/2016</a:t>
             </a:fld>
             <a:endParaRPr lang="zh-SG" altLang="en-US"/>
           </a:p>
@@ -5777,7 +6577,7 @@
           <a:p>
             <a:fld id="{CCC07F1D-6EC5-4E99-BA92-5EA217BDCEFD}" type="datetimeFigureOut">
               <a:rPr lang="zh-SG" altLang="en-US" smtClean="0"/>
-              <a:t>29/1/2016</a:t>
+              <a:t>31/1/2016</a:t>
             </a:fld>
             <a:endParaRPr lang="zh-SG" altLang="en-US"/>
           </a:p>
@@ -6120,7 +6920,7 @@
           <a:p>
             <a:fld id="{CCC07F1D-6EC5-4E99-BA92-5EA217BDCEFD}" type="datetimeFigureOut">
               <a:rPr lang="zh-SG" altLang="en-US" smtClean="0"/>
-              <a:t>29/1/2016</a:t>
+              <a:t>31/1/2016</a:t>
             </a:fld>
             <a:endParaRPr lang="zh-SG" altLang="en-US"/>
           </a:p>
@@ -6459,7 +7259,7 @@
           <a:p>
             <a:fld id="{CCC07F1D-6EC5-4E99-BA92-5EA217BDCEFD}" type="datetimeFigureOut">
               <a:rPr lang="zh-SG" altLang="en-US" smtClean="0"/>
-              <a:t>29/1/2016</a:t>
+              <a:t>31/1/2016</a:t>
             </a:fld>
             <a:endParaRPr lang="zh-SG" altLang="en-US"/>
           </a:p>
@@ -6936,7 +7736,7 @@
           <a:p>
             <a:fld id="{CCC07F1D-6EC5-4E99-BA92-5EA217BDCEFD}" type="datetimeFigureOut">
               <a:rPr lang="zh-SG" altLang="en-US" smtClean="0"/>
-              <a:t>29/1/2016</a:t>
+              <a:t>31/1/2016</a:t>
             </a:fld>
             <a:endParaRPr lang="zh-SG" altLang="en-US"/>
           </a:p>
@@ -7157,7 +7957,7 @@
           <a:p>
             <a:fld id="{CCC07F1D-6EC5-4E99-BA92-5EA217BDCEFD}" type="datetimeFigureOut">
               <a:rPr lang="zh-SG" altLang="en-US" smtClean="0"/>
-              <a:t>29/1/2016</a:t>
+              <a:t>31/1/2016</a:t>
             </a:fld>
             <a:endParaRPr lang="zh-SG" altLang="en-US"/>
           </a:p>
@@ -7252,7 +8052,7 @@
           <a:p>
             <a:fld id="{CCC07F1D-6EC5-4E99-BA92-5EA217BDCEFD}" type="datetimeFigureOut">
               <a:rPr lang="zh-SG" altLang="en-US" smtClean="0"/>
-              <a:t>29/1/2016</a:t>
+              <a:t>31/1/2016</a:t>
             </a:fld>
             <a:endParaRPr lang="zh-SG" altLang="en-US"/>
           </a:p>
@@ -7719,7 +8519,7 @@
           <a:p>
             <a:fld id="{CCC07F1D-6EC5-4E99-BA92-5EA217BDCEFD}" type="datetimeFigureOut">
               <a:rPr lang="zh-SG" altLang="en-US" smtClean="0"/>
-              <a:t>29/1/2016</a:t>
+              <a:t>31/1/2016</a:t>
             </a:fld>
             <a:endParaRPr lang="zh-SG" altLang="en-US"/>
           </a:p>
@@ -8032,7 +8832,7 @@
           <a:p>
             <a:fld id="{CCC07F1D-6EC5-4E99-BA92-5EA217BDCEFD}" type="datetimeFigureOut">
               <a:rPr lang="zh-SG" altLang="en-US" smtClean="0"/>
-              <a:t>29/1/2016</a:t>
+              <a:t>31/1/2016</a:t>
             </a:fld>
             <a:endParaRPr lang="zh-SG" altLang="en-US"/>
           </a:p>
@@ -8302,7 +9102,7 @@
           <a:p>
             <a:fld id="{CCC07F1D-6EC5-4E99-BA92-5EA217BDCEFD}" type="datetimeFigureOut">
               <a:rPr lang="zh-SG" altLang="en-US" smtClean="0"/>
-              <a:t>29/1/2016</a:t>
+              <a:t>31/1/2016</a:t>
             </a:fld>
             <a:endParaRPr lang="zh-SG" altLang="en-US"/>
           </a:p>
@@ -8840,6 +9640,586 @@
 </p:sld>
 </file>
 
+<file path=ppt/slides/slide10.xml><?xml version="1.0" encoding="utf-8"?>
+<p:sld xmlns:a="http://schemas.openxmlformats.org/drawingml/2006/main" xmlns:r="http://schemas.openxmlformats.org/officeDocument/2006/relationships" xmlns:p="http://schemas.openxmlformats.org/presentationml/2006/main">
+  <p:cSld>
+    <p:spTree>
+      <p:nvGrpSpPr>
+        <p:cNvPr id="1" name=""/>
+        <p:cNvGrpSpPr/>
+        <p:nvPr/>
+      </p:nvGrpSpPr>
+      <p:grpSpPr>
+        <a:xfrm>
+          <a:off x="0" y="0"/>
+          <a:ext cx="0" cy="0"/>
+          <a:chOff x="0" y="0"/>
+          <a:chExt cx="0" cy="0"/>
+        </a:xfrm>
+      </p:grpSpPr>
+      <p:sp>
+        <p:nvSpPr>
+          <p:cNvPr id="2" name="标题 1"/>
+          <p:cNvSpPr>
+            <a:spLocks noGrp="1"/>
+          </p:cNvSpPr>
+          <p:nvPr>
+            <p:ph type="title"/>
+          </p:nvPr>
+        </p:nvSpPr>
+        <p:spPr/>
+        <p:txBody>
+          <a:bodyPr/>
+          <a:lstStyle/>
+          <a:p>
+            <a:r>
+              <a:rPr lang="en-SG" altLang="zh-SG" dirty="0" smtClean="0"/>
+              <a:t>Communications</a:t>
+            </a:r>
+            <a:endParaRPr lang="zh-SG" altLang="en-US" dirty="0"/>
+          </a:p>
+        </p:txBody>
+      </p:sp>
+      <p:sp>
+        <p:nvSpPr>
+          <p:cNvPr id="5" name="内容占位符 4"/>
+          <p:cNvSpPr>
+            <a:spLocks noGrp="1"/>
+          </p:cNvSpPr>
+          <p:nvPr>
+            <p:ph idx="1"/>
+          </p:nvPr>
+        </p:nvSpPr>
+        <p:spPr>
+          <a:xfrm>
+            <a:off x="507597" y="2296799"/>
+            <a:ext cx="7524003" cy="1091323"/>
+          </a:xfrm>
+        </p:spPr>
+        <p:txBody>
+          <a:bodyPr/>
+          <a:lstStyle/>
+          <a:p>
+            <a:r>
+              <a:rPr lang="en-SG" altLang="zh-SG" dirty="0" smtClean="0"/>
+              <a:t>Previous or present work partners</a:t>
+            </a:r>
+            <a:endParaRPr lang="en-SG" altLang="zh-SG" dirty="0" smtClean="0"/>
+          </a:p>
+          <a:p>
+            <a:pPr marL="0" indent="0">
+              <a:buNone/>
+            </a:pPr>
+            <a:endParaRPr lang="en-US" altLang="zh-SG" dirty="0" smtClean="0"/>
+          </a:p>
+        </p:txBody>
+      </p:sp>
+      <p:sp>
+        <p:nvSpPr>
+          <p:cNvPr id="6" name="文本框 8"/>
+          <p:cNvSpPr txBox="1"/>
+          <p:nvPr/>
+        </p:nvSpPr>
+        <p:spPr>
+          <a:xfrm>
+            <a:off x="3041319" y="6627168"/>
+            <a:ext cx="6159058" cy="230832"/>
+          </a:xfrm>
+          <a:prstGeom prst="rect">
+            <a:avLst/>
+          </a:prstGeom>
+          <a:noFill/>
+        </p:spPr>
+        <p:txBody>
+          <a:bodyPr wrap="none" rtlCol="0">
+            <a:spAutoFit/>
+          </a:bodyPr>
+          <a:lstStyle/>
+          <a:p>
+            <a:r>
+              <a:rPr lang="en-US" altLang="zh-SG" sz="900" dirty="0" smtClean="0"/>
+              <a:t>*Source </a:t>
+            </a:r>
+            <a:r>
+              <a:rPr lang="en-US" altLang="zh-SG" sz="900" dirty="0"/>
+              <a:t>: http://au.hudson.com/job-seekers/helpful-tips-career-advice/interview-preparation/interview-tips</a:t>
+            </a:r>
+            <a:endParaRPr lang="zh-SG" altLang="en-US" sz="900" dirty="0"/>
+          </a:p>
+        </p:txBody>
+      </p:sp>
+      <p:sp>
+        <p:nvSpPr>
+          <p:cNvPr id="7" name="文本框 8"/>
+          <p:cNvSpPr txBox="1"/>
+          <p:nvPr/>
+        </p:nvSpPr>
+        <p:spPr>
+          <a:xfrm>
+            <a:off x="3634598" y="6374939"/>
+            <a:ext cx="2736647" cy="230832"/>
+          </a:xfrm>
+          <a:prstGeom prst="rect">
+            <a:avLst/>
+          </a:prstGeom>
+          <a:noFill/>
+        </p:spPr>
+        <p:txBody>
+          <a:bodyPr wrap="none" rtlCol="0">
+            <a:spAutoFit/>
+          </a:bodyPr>
+          <a:lstStyle/>
+          <a:p>
+            <a:r>
+              <a:rPr lang="en-US" altLang="zh-SG" sz="900" dirty="0" smtClean="0"/>
+              <a:t>Photo by: Craig </a:t>
+            </a:r>
+            <a:r>
+              <a:rPr lang="en-US" altLang="zh-SG" sz="900" dirty="0" err="1" smtClean="0"/>
+              <a:t>Sunter</a:t>
+            </a:r>
+            <a:r>
+              <a:rPr lang="en-US" altLang="zh-SG" sz="900" dirty="0"/>
+              <a:t>, https://flic.kr/p/zTu1PY</a:t>
+            </a:r>
+            <a:endParaRPr lang="zh-SG" altLang="en-US" sz="900" dirty="0"/>
+          </a:p>
+        </p:txBody>
+      </p:sp>
+      <p:pic>
+        <p:nvPicPr>
+          <p:cNvPr id="3" name="Picture 2"/>
+          <p:cNvPicPr>
+            <a:picLocks noChangeAspect="1"/>
+          </p:cNvPicPr>
+          <p:nvPr/>
+        </p:nvPicPr>
+        <p:blipFill>
+          <a:blip r:embed="rId3">
+            <a:extLst>
+              <a:ext uri="{28A0092B-C50C-407E-A947-70E740481C1C}">
+                <a14:useLocalDpi xmlns:a14="http://schemas.microsoft.com/office/drawing/2010/main" val="0"/>
+              </a:ext>
+            </a:extLst>
+          </a:blip>
+          <a:stretch>
+            <a:fillRect/>
+          </a:stretch>
+        </p:blipFill>
+        <p:spPr>
+          <a:xfrm>
+            <a:off x="2671539" y="2880123"/>
+            <a:ext cx="3646764" cy="3494816"/>
+          </a:xfrm>
+          <a:prstGeom prst="rect">
+            <a:avLst/>
+          </a:prstGeom>
+        </p:spPr>
+      </p:pic>
+    </p:spTree>
+    <p:extLst>
+      <p:ext uri="{BB962C8B-B14F-4D97-AF65-F5344CB8AC3E}">
+        <p14:creationId xmlns:p14="http://schemas.microsoft.com/office/powerpoint/2010/main" val="985016793"/>
+      </p:ext>
+    </p:extLst>
+  </p:cSld>
+  <p:clrMapOvr>
+    <a:masterClrMapping/>
+  </p:clrMapOvr>
+  <p:timing>
+    <p:tnLst>
+      <p:par>
+        <p:cTn id="1" dur="indefinite" restart="never" nodeType="tmRoot"/>
+      </p:par>
+    </p:tnLst>
+  </p:timing>
+</p:sld>
+</file>
+
+<file path=ppt/slides/slide11.xml><?xml version="1.0" encoding="utf-8"?>
+<p:sld xmlns:a="http://schemas.openxmlformats.org/drawingml/2006/main" xmlns:r="http://schemas.openxmlformats.org/officeDocument/2006/relationships" xmlns:p="http://schemas.openxmlformats.org/presentationml/2006/main">
+  <p:cSld>
+    <p:spTree>
+      <p:nvGrpSpPr>
+        <p:cNvPr id="1" name=""/>
+        <p:cNvGrpSpPr/>
+        <p:nvPr/>
+      </p:nvGrpSpPr>
+      <p:grpSpPr>
+        <a:xfrm>
+          <a:off x="0" y="0"/>
+          <a:ext cx="0" cy="0"/>
+          <a:chOff x="0" y="0"/>
+          <a:chExt cx="0" cy="0"/>
+        </a:xfrm>
+      </p:grpSpPr>
+      <p:pic>
+        <p:nvPicPr>
+          <p:cNvPr id="3" name="Picture 2"/>
+          <p:cNvPicPr>
+            <a:picLocks noChangeAspect="1"/>
+          </p:cNvPicPr>
+          <p:nvPr/>
+        </p:nvPicPr>
+        <p:blipFill>
+          <a:blip r:embed="rId3">
+            <a:extLst>
+              <a:ext uri="{28A0092B-C50C-407E-A947-70E740481C1C}">
+                <a14:useLocalDpi xmlns:a14="http://schemas.microsoft.com/office/drawing/2010/main" val="0"/>
+              </a:ext>
+            </a:extLst>
+          </a:blip>
+          <a:stretch>
+            <a:fillRect/>
+          </a:stretch>
+        </p:blipFill>
+        <p:spPr>
+          <a:xfrm>
+            <a:off x="1983598" y="2942923"/>
+            <a:ext cx="5180402" cy="3432016"/>
+          </a:xfrm>
+          <a:prstGeom prst="rect">
+            <a:avLst/>
+          </a:prstGeom>
+        </p:spPr>
+      </p:pic>
+      <p:sp>
+        <p:nvSpPr>
+          <p:cNvPr id="2" name="标题 1"/>
+          <p:cNvSpPr>
+            <a:spLocks noGrp="1"/>
+          </p:cNvSpPr>
+          <p:nvPr>
+            <p:ph type="title"/>
+          </p:nvPr>
+        </p:nvSpPr>
+        <p:spPr/>
+        <p:txBody>
+          <a:bodyPr/>
+          <a:lstStyle/>
+          <a:p>
+            <a:r>
+              <a:rPr lang="en-SG" altLang="zh-SG" dirty="0" smtClean="0"/>
+              <a:t>Behaviour</a:t>
+            </a:r>
+            <a:endParaRPr lang="zh-SG" altLang="en-US" dirty="0"/>
+          </a:p>
+        </p:txBody>
+      </p:sp>
+      <p:sp>
+        <p:nvSpPr>
+          <p:cNvPr id="5" name="内容占位符 4"/>
+          <p:cNvSpPr>
+            <a:spLocks noGrp="1"/>
+          </p:cNvSpPr>
+          <p:nvPr>
+            <p:ph idx="1"/>
+          </p:nvPr>
+        </p:nvSpPr>
+        <p:spPr>
+          <a:xfrm>
+            <a:off x="507597" y="2296799"/>
+            <a:ext cx="7524003" cy="1091323"/>
+          </a:xfrm>
+        </p:spPr>
+        <p:txBody>
+          <a:bodyPr/>
+          <a:lstStyle/>
+          <a:p>
+            <a:r>
+              <a:rPr lang="en-SG" altLang="zh-SG" dirty="0" smtClean="0"/>
+              <a:t>Chewing gum/Eating Food</a:t>
+            </a:r>
+            <a:endParaRPr lang="en-SG" altLang="zh-SG" dirty="0"/>
+          </a:p>
+          <a:p>
+            <a:pPr marL="0" indent="0">
+              <a:buNone/>
+            </a:pPr>
+            <a:endParaRPr lang="en-US" altLang="zh-SG" dirty="0" smtClean="0"/>
+          </a:p>
+        </p:txBody>
+      </p:sp>
+      <p:sp>
+        <p:nvSpPr>
+          <p:cNvPr id="6" name="文本框 8"/>
+          <p:cNvSpPr txBox="1"/>
+          <p:nvPr/>
+        </p:nvSpPr>
+        <p:spPr>
+          <a:xfrm>
+            <a:off x="3422319" y="6627168"/>
+            <a:ext cx="5775940" cy="230832"/>
+          </a:xfrm>
+          <a:prstGeom prst="rect">
+            <a:avLst/>
+          </a:prstGeom>
+          <a:noFill/>
+        </p:spPr>
+        <p:txBody>
+          <a:bodyPr wrap="none" rtlCol="0">
+            <a:spAutoFit/>
+          </a:bodyPr>
+          <a:lstStyle/>
+          <a:p>
+            <a:r>
+              <a:rPr lang="en-US" altLang="zh-SG" sz="900" dirty="0" smtClean="0"/>
+              <a:t>*Source </a:t>
+            </a:r>
+            <a:r>
+              <a:rPr lang="en-US" altLang="zh-SG" sz="900" dirty="0"/>
+              <a:t>: http://cals.arizona.edu/clubs/manrrs/MANRRS%20Web/GENERAL%20INTERVIEW%20TIPS.pdf</a:t>
+            </a:r>
+            <a:endParaRPr lang="zh-SG" altLang="en-US" sz="900" dirty="0"/>
+          </a:p>
+        </p:txBody>
+      </p:sp>
+      <p:sp>
+        <p:nvSpPr>
+          <p:cNvPr id="7" name="文本框 8"/>
+          <p:cNvSpPr txBox="1"/>
+          <p:nvPr/>
+        </p:nvSpPr>
+        <p:spPr>
+          <a:xfrm>
+            <a:off x="4269598" y="6374939"/>
+            <a:ext cx="3074881" cy="230832"/>
+          </a:xfrm>
+          <a:prstGeom prst="rect">
+            <a:avLst/>
+          </a:prstGeom>
+          <a:noFill/>
+        </p:spPr>
+        <p:txBody>
+          <a:bodyPr wrap="none" rtlCol="0">
+            <a:spAutoFit/>
+          </a:bodyPr>
+          <a:lstStyle/>
+          <a:p>
+            <a:r>
+              <a:rPr lang="en-US" altLang="zh-SG" sz="900" dirty="0" smtClean="0"/>
+              <a:t>Photo by: Veronica Aguilar, </a:t>
+            </a:r>
+            <a:r>
+              <a:rPr lang="en-US" altLang="zh-SG" sz="900" dirty="0"/>
+              <a:t>https://flic.kr/p/oDU2kk</a:t>
+            </a:r>
+            <a:endParaRPr lang="zh-SG" altLang="en-US" sz="900" dirty="0"/>
+          </a:p>
+        </p:txBody>
+      </p:sp>
+    </p:spTree>
+    <p:extLst>
+      <p:ext uri="{BB962C8B-B14F-4D97-AF65-F5344CB8AC3E}">
+        <p14:creationId xmlns:p14="http://schemas.microsoft.com/office/powerpoint/2010/main" val="1218865844"/>
+      </p:ext>
+    </p:extLst>
+  </p:cSld>
+  <p:clrMapOvr>
+    <a:masterClrMapping/>
+  </p:clrMapOvr>
+  <p:timing>
+    <p:tnLst>
+      <p:par>
+        <p:cTn id="1" dur="indefinite" restart="never" nodeType="tmRoot"/>
+      </p:par>
+    </p:tnLst>
+  </p:timing>
+</p:sld>
+</file>
+
+<file path=ppt/slides/slide12.xml><?xml version="1.0" encoding="utf-8"?>
+<p:sld xmlns:a="http://schemas.openxmlformats.org/drawingml/2006/main" xmlns:r="http://schemas.openxmlformats.org/officeDocument/2006/relationships" xmlns:p="http://schemas.openxmlformats.org/presentationml/2006/main">
+  <p:cSld>
+    <p:spTree>
+      <p:nvGrpSpPr>
+        <p:cNvPr id="1" name=""/>
+        <p:cNvGrpSpPr/>
+        <p:nvPr/>
+      </p:nvGrpSpPr>
+      <p:grpSpPr>
+        <a:xfrm>
+          <a:off x="0" y="0"/>
+          <a:ext cx="0" cy="0"/>
+          <a:chOff x="0" y="0"/>
+          <a:chExt cx="0" cy="0"/>
+        </a:xfrm>
+      </p:grpSpPr>
+      <p:sp>
+        <p:nvSpPr>
+          <p:cNvPr id="2" name="标题 1"/>
+          <p:cNvSpPr>
+            <a:spLocks noGrp="1"/>
+          </p:cNvSpPr>
+          <p:nvPr>
+            <p:ph type="title"/>
+          </p:nvPr>
+        </p:nvSpPr>
+        <p:spPr/>
+        <p:txBody>
+          <a:bodyPr/>
+          <a:lstStyle/>
+          <a:p>
+            <a:r>
+              <a:rPr lang="en-SG" altLang="zh-SG" dirty="0" smtClean="0"/>
+              <a:t>Personal grooming</a:t>
+            </a:r>
+            <a:endParaRPr lang="zh-SG" altLang="en-US" dirty="0"/>
+          </a:p>
+        </p:txBody>
+      </p:sp>
+      <p:sp>
+        <p:nvSpPr>
+          <p:cNvPr id="5" name="内容占位符 4"/>
+          <p:cNvSpPr>
+            <a:spLocks noGrp="1"/>
+          </p:cNvSpPr>
+          <p:nvPr>
+            <p:ph idx="1"/>
+          </p:nvPr>
+        </p:nvSpPr>
+        <p:spPr>
+          <a:xfrm>
+            <a:off x="507597" y="2296799"/>
+            <a:ext cx="7524003" cy="1091323"/>
+          </a:xfrm>
+        </p:spPr>
+        <p:txBody>
+          <a:bodyPr/>
+          <a:lstStyle/>
+          <a:p>
+            <a:r>
+              <a:rPr lang="en-SG" altLang="zh-SG" dirty="0" smtClean="0"/>
+              <a:t>Heavy perfume/cologne</a:t>
+            </a:r>
+            <a:endParaRPr lang="en-SG" altLang="zh-SG" dirty="0" smtClean="0"/>
+          </a:p>
+          <a:p>
+            <a:pPr marL="0" indent="0">
+              <a:buNone/>
+            </a:pPr>
+            <a:endParaRPr lang="en-US" altLang="zh-SG" dirty="0" smtClean="0"/>
+          </a:p>
+        </p:txBody>
+      </p:sp>
+      <p:sp>
+        <p:nvSpPr>
+          <p:cNvPr id="6" name="文本框 8"/>
+          <p:cNvSpPr txBox="1"/>
+          <p:nvPr/>
+        </p:nvSpPr>
+        <p:spPr>
+          <a:xfrm>
+            <a:off x="3422319" y="6627168"/>
+            <a:ext cx="5775940" cy="230832"/>
+          </a:xfrm>
+          <a:prstGeom prst="rect">
+            <a:avLst/>
+          </a:prstGeom>
+          <a:noFill/>
+        </p:spPr>
+        <p:txBody>
+          <a:bodyPr wrap="none" rtlCol="0">
+            <a:spAutoFit/>
+          </a:bodyPr>
+          <a:lstStyle/>
+          <a:p>
+            <a:r>
+              <a:rPr lang="en-US" altLang="zh-SG" sz="900" dirty="0" smtClean="0"/>
+              <a:t>*Source </a:t>
+            </a:r>
+            <a:r>
+              <a:rPr lang="en-US" altLang="zh-SG" sz="900" dirty="0"/>
+              <a:t>: http://cals.arizona.edu/clubs/manrrs/MANRRS%20Web/GENERAL%20INTERVIEW%20TIPS.pdf</a:t>
+            </a:r>
+            <a:endParaRPr lang="zh-SG" altLang="en-US" sz="900" dirty="0"/>
+          </a:p>
+        </p:txBody>
+      </p:sp>
+      <p:sp>
+        <p:nvSpPr>
+          <p:cNvPr id="7" name="文本框 8"/>
+          <p:cNvSpPr txBox="1"/>
+          <p:nvPr/>
+        </p:nvSpPr>
+        <p:spPr>
+          <a:xfrm>
+            <a:off x="3126598" y="6374939"/>
+            <a:ext cx="2965877" cy="230832"/>
+          </a:xfrm>
+          <a:prstGeom prst="rect">
+            <a:avLst/>
+          </a:prstGeom>
+          <a:noFill/>
+        </p:spPr>
+        <p:txBody>
+          <a:bodyPr wrap="none" rtlCol="0">
+            <a:spAutoFit/>
+          </a:bodyPr>
+          <a:lstStyle/>
+          <a:p>
+            <a:r>
+              <a:rPr lang="en-US" altLang="zh-SG" sz="900" dirty="0" smtClean="0"/>
+              <a:t>Photo by: edmondwong8, </a:t>
+            </a:r>
+            <a:r>
+              <a:rPr lang="en-US" altLang="zh-SG" sz="900" dirty="0"/>
+              <a:t>https://flic.kr/p/73PURc</a:t>
+            </a:r>
+            <a:endParaRPr lang="zh-SG" altLang="en-US" sz="900" dirty="0"/>
+          </a:p>
+        </p:txBody>
+      </p:sp>
+      <p:pic>
+        <p:nvPicPr>
+          <p:cNvPr id="4" name="Picture 3"/>
+          <p:cNvPicPr>
+            <a:picLocks noChangeAspect="1"/>
+          </p:cNvPicPr>
+          <p:nvPr/>
+        </p:nvPicPr>
+        <p:blipFill>
+          <a:blip r:embed="rId3" cstate="print">
+            <a:extLst>
+              <a:ext uri="{28A0092B-C50C-407E-A947-70E740481C1C}">
+                <a14:useLocalDpi xmlns:a14="http://schemas.microsoft.com/office/drawing/2010/main" val="0"/>
+              </a:ext>
+            </a:extLst>
+          </a:blip>
+          <a:stretch>
+            <a:fillRect/>
+          </a:stretch>
+        </p:blipFill>
+        <p:spPr>
+          <a:xfrm>
+            <a:off x="3175714" y="2875907"/>
+            <a:ext cx="2792567" cy="3561554"/>
+          </a:xfrm>
+          <a:prstGeom prst="rect">
+            <a:avLst/>
+          </a:prstGeom>
+        </p:spPr>
+      </p:pic>
+    </p:spTree>
+    <p:extLst>
+      <p:ext uri="{BB962C8B-B14F-4D97-AF65-F5344CB8AC3E}">
+        <p14:creationId xmlns:p14="http://schemas.microsoft.com/office/powerpoint/2010/main" val="3387568799"/>
+      </p:ext>
+    </p:extLst>
+  </p:cSld>
+  <p:clrMapOvr>
+    <a:masterClrMapping/>
+  </p:clrMapOvr>
+  <p:timing>
+    <p:tnLst>
+      <p:par>
+        <p:cTn id="1" dur="indefinite" restart="never" nodeType="tmRoot"/>
+      </p:par>
+    </p:tnLst>
+  </p:timing>
+</p:sld>
+</file>
+
 <file path=ppt/slides/slide2.xml><?xml version="1.0" encoding="utf-8"?>
 <p:sld xmlns:a="http://schemas.openxmlformats.org/drawingml/2006/main" xmlns:r="http://schemas.openxmlformats.org/officeDocument/2006/relationships" xmlns:p="http://schemas.openxmlformats.org/presentationml/2006/main">
   <p:cSld>
@@ -8874,7 +10254,15 @@
           <a:p>
             <a:r>
               <a:rPr lang="en-SG" altLang="zh-SG" dirty="0"/>
-              <a:t>General skills</a:t>
+              <a:t>General </a:t>
+            </a:r>
+            <a:r>
+              <a:rPr lang="en-SG" altLang="zh-SG" dirty="0" smtClean="0"/>
+              <a:t>skills: “</a:t>
+            </a:r>
+            <a:r>
+              <a:rPr lang="en-SG" altLang="zh-SG" dirty="0" err="1" smtClean="0"/>
+              <a:t>Do”s</a:t>
             </a:r>
             <a:endParaRPr lang="zh-SG" altLang="en-US" dirty="0"/>
           </a:p>
@@ -9502,6 +10890,494 @@
   <p:clrMapOvr>
     <a:masterClrMapping/>
   </p:clrMapOvr>
+</p:sld>
+</file>
+
+<file path=ppt/slides/slide7.xml><?xml version="1.0" encoding="utf-8"?>
+<p:sld xmlns:a="http://schemas.openxmlformats.org/drawingml/2006/main" xmlns:r="http://schemas.openxmlformats.org/officeDocument/2006/relationships" xmlns:p="http://schemas.openxmlformats.org/presentationml/2006/main">
+  <p:cSld>
+    <p:spTree>
+      <p:nvGrpSpPr>
+        <p:cNvPr id="1" name=""/>
+        <p:cNvGrpSpPr/>
+        <p:nvPr/>
+      </p:nvGrpSpPr>
+      <p:grpSpPr>
+        <a:xfrm>
+          <a:off x="0" y="0"/>
+          <a:ext cx="0" cy="0"/>
+          <a:chOff x="0" y="0"/>
+          <a:chExt cx="0" cy="0"/>
+        </a:xfrm>
+      </p:grpSpPr>
+      <p:sp>
+        <p:nvSpPr>
+          <p:cNvPr id="2" name="标题 1"/>
+          <p:cNvSpPr>
+            <a:spLocks noGrp="1"/>
+          </p:cNvSpPr>
+          <p:nvPr>
+            <p:ph type="title"/>
+          </p:nvPr>
+        </p:nvSpPr>
+        <p:spPr/>
+        <p:txBody>
+          <a:bodyPr/>
+          <a:lstStyle/>
+          <a:p>
+            <a:r>
+              <a:rPr lang="en-SG" altLang="zh-SG" dirty="0"/>
+              <a:t>General </a:t>
+            </a:r>
+            <a:r>
+              <a:rPr lang="en-SG" altLang="zh-SG" dirty="0" smtClean="0"/>
+              <a:t>skills: “</a:t>
+            </a:r>
+            <a:r>
+              <a:rPr lang="en-SG" altLang="zh-SG" dirty="0" err="1" smtClean="0"/>
+              <a:t>Don’t”s</a:t>
+            </a:r>
+            <a:endParaRPr lang="zh-SG" altLang="en-US" dirty="0"/>
+          </a:p>
+        </p:txBody>
+      </p:sp>
+      <p:sp>
+        <p:nvSpPr>
+          <p:cNvPr id="3" name="文本占位符 2"/>
+          <p:cNvSpPr>
+            <a:spLocks noGrp="1"/>
+          </p:cNvSpPr>
+          <p:nvPr>
+            <p:ph type="body" idx="1"/>
+          </p:nvPr>
+        </p:nvSpPr>
+        <p:spPr>
+          <a:xfrm>
+            <a:off x="804863" y="5281200"/>
+            <a:ext cx="7526337" cy="628647"/>
+          </a:xfrm>
+        </p:spPr>
+        <p:txBody>
+          <a:bodyPr/>
+          <a:lstStyle/>
+          <a:p>
+            <a:r>
+              <a:rPr lang="en-SG" altLang="zh-SG" dirty="0" smtClean="0"/>
+              <a:t>Communications | Personal grooming | Behaviour</a:t>
+            </a:r>
+            <a:endParaRPr lang="zh-SG" altLang="en-US" dirty="0"/>
+          </a:p>
+        </p:txBody>
+      </p:sp>
+    </p:spTree>
+    <p:extLst>
+      <p:ext uri="{BB962C8B-B14F-4D97-AF65-F5344CB8AC3E}">
+        <p14:creationId xmlns:p14="http://schemas.microsoft.com/office/powerpoint/2010/main" val="3191458548"/>
+      </p:ext>
+    </p:extLst>
+  </p:cSld>
+  <p:clrMapOvr>
+    <a:masterClrMapping/>
+  </p:clrMapOvr>
+  <p:timing>
+    <p:tnLst>
+      <p:par>
+        <p:cTn id="1" dur="indefinite" restart="never" nodeType="tmRoot"/>
+      </p:par>
+    </p:tnLst>
+  </p:timing>
+</p:sld>
+</file>
+
+<file path=ppt/slides/slide8.xml><?xml version="1.0" encoding="utf-8"?>
+<p:sld xmlns:a="http://schemas.openxmlformats.org/drawingml/2006/main" xmlns:r="http://schemas.openxmlformats.org/officeDocument/2006/relationships" xmlns:p="http://schemas.openxmlformats.org/presentationml/2006/main">
+  <p:cSld>
+    <p:spTree>
+      <p:nvGrpSpPr>
+        <p:cNvPr id="1" name=""/>
+        <p:cNvGrpSpPr/>
+        <p:nvPr/>
+      </p:nvGrpSpPr>
+      <p:grpSpPr>
+        <a:xfrm>
+          <a:off x="0" y="0"/>
+          <a:ext cx="0" cy="0"/>
+          <a:chOff x="0" y="0"/>
+          <a:chExt cx="0" cy="0"/>
+        </a:xfrm>
+      </p:grpSpPr>
+      <p:sp>
+        <p:nvSpPr>
+          <p:cNvPr id="2" name="标题 1"/>
+          <p:cNvSpPr>
+            <a:spLocks noGrp="1"/>
+          </p:cNvSpPr>
+          <p:nvPr>
+            <p:ph type="title"/>
+          </p:nvPr>
+        </p:nvSpPr>
+        <p:spPr/>
+        <p:txBody>
+          <a:bodyPr/>
+          <a:lstStyle/>
+          <a:p>
+            <a:r>
+              <a:rPr lang="en-SG" altLang="zh-SG" dirty="0" smtClean="0"/>
+              <a:t>Communications</a:t>
+            </a:r>
+            <a:endParaRPr lang="zh-SG" altLang="en-US" dirty="0"/>
+          </a:p>
+        </p:txBody>
+      </p:sp>
+      <p:sp>
+        <p:nvSpPr>
+          <p:cNvPr id="5" name="内容占位符 4"/>
+          <p:cNvSpPr>
+            <a:spLocks noGrp="1"/>
+          </p:cNvSpPr>
+          <p:nvPr>
+            <p:ph idx="1"/>
+          </p:nvPr>
+        </p:nvSpPr>
+        <p:spPr>
+          <a:xfrm>
+            <a:off x="507597" y="2296799"/>
+            <a:ext cx="7524003" cy="1091323"/>
+          </a:xfrm>
+        </p:spPr>
+        <p:txBody>
+          <a:bodyPr/>
+          <a:lstStyle/>
+          <a:p>
+            <a:r>
+              <a:rPr lang="en-US" altLang="zh-SG" dirty="0" smtClean="0"/>
+              <a:t>Vague Questions</a:t>
+            </a:r>
+            <a:endParaRPr lang="en-SG" altLang="zh-SG" dirty="0"/>
+          </a:p>
+          <a:p>
+            <a:pPr marL="0" indent="0">
+              <a:buNone/>
+            </a:pPr>
+            <a:endParaRPr lang="en-US" altLang="zh-SG" dirty="0" smtClean="0"/>
+          </a:p>
+        </p:txBody>
+      </p:sp>
+      <p:pic>
+        <p:nvPicPr>
+          <p:cNvPr id="3" name="Picture 2"/>
+          <p:cNvPicPr>
+            <a:picLocks noChangeAspect="1"/>
+          </p:cNvPicPr>
+          <p:nvPr/>
+        </p:nvPicPr>
+        <p:blipFill>
+          <a:blip r:embed="rId3">
+            <a:extLst>
+              <a:ext uri="{28A0092B-C50C-407E-A947-70E740481C1C}">
+                <a14:useLocalDpi xmlns:a14="http://schemas.microsoft.com/office/drawing/2010/main" val="0"/>
+              </a:ext>
+            </a:extLst>
+          </a:blip>
+          <a:stretch>
+            <a:fillRect/>
+          </a:stretch>
+        </p:blipFill>
+        <p:spPr>
+          <a:xfrm>
+            <a:off x="1996200" y="2942924"/>
+            <a:ext cx="5167800" cy="3402135"/>
+          </a:xfrm>
+          <a:prstGeom prst="rect">
+            <a:avLst/>
+          </a:prstGeom>
+        </p:spPr>
+      </p:pic>
+      <p:sp>
+        <p:nvSpPr>
+          <p:cNvPr id="6" name="文本框 8"/>
+          <p:cNvSpPr txBox="1"/>
+          <p:nvPr/>
+        </p:nvSpPr>
+        <p:spPr>
+          <a:xfrm>
+            <a:off x="3422319" y="6627168"/>
+            <a:ext cx="5775940" cy="230832"/>
+          </a:xfrm>
+          <a:prstGeom prst="rect">
+            <a:avLst/>
+          </a:prstGeom>
+          <a:noFill/>
+        </p:spPr>
+        <p:txBody>
+          <a:bodyPr wrap="none" rtlCol="0">
+            <a:spAutoFit/>
+          </a:bodyPr>
+          <a:lstStyle/>
+          <a:p>
+            <a:r>
+              <a:rPr lang="en-US" altLang="zh-SG" sz="900" dirty="0" smtClean="0"/>
+              <a:t>*Source </a:t>
+            </a:r>
+            <a:r>
+              <a:rPr lang="en-US" altLang="zh-SG" sz="900" dirty="0"/>
+              <a:t>: http://cals.arizona.edu/clubs/manrrs/MANRRS%20Web/GENERAL%20INTERVIEW%20TIPS.pdf</a:t>
+            </a:r>
+            <a:endParaRPr lang="zh-SG" altLang="en-US" sz="900" dirty="0"/>
+          </a:p>
+        </p:txBody>
+      </p:sp>
+      <p:sp>
+        <p:nvSpPr>
+          <p:cNvPr id="7" name="文本框 8"/>
+          <p:cNvSpPr txBox="1"/>
+          <p:nvPr/>
+        </p:nvSpPr>
+        <p:spPr>
+          <a:xfrm>
+            <a:off x="4432162" y="6345059"/>
+            <a:ext cx="2731838" cy="230832"/>
+          </a:xfrm>
+          <a:prstGeom prst="rect">
+            <a:avLst/>
+          </a:prstGeom>
+          <a:noFill/>
+        </p:spPr>
+        <p:txBody>
+          <a:bodyPr wrap="none" rtlCol="0">
+            <a:spAutoFit/>
+          </a:bodyPr>
+          <a:lstStyle/>
+          <a:p>
+            <a:r>
+              <a:rPr lang="en-US" altLang="zh-SG" sz="900" dirty="0" smtClean="0"/>
+              <a:t>Photo by: Brian Moore</a:t>
+            </a:r>
+            <a:r>
+              <a:rPr lang="en-US" altLang="zh-SG" sz="900" dirty="0"/>
+              <a:t>, https://flic.kr/p/weYd8</a:t>
+            </a:r>
+            <a:endParaRPr lang="zh-SG" altLang="en-US" sz="900" dirty="0"/>
+          </a:p>
+        </p:txBody>
+      </p:sp>
+    </p:spTree>
+    <p:extLst>
+      <p:ext uri="{BB962C8B-B14F-4D97-AF65-F5344CB8AC3E}">
+        <p14:creationId xmlns:p14="http://schemas.microsoft.com/office/powerpoint/2010/main" val="3566070255"/>
+      </p:ext>
+    </p:extLst>
+  </p:cSld>
+  <p:clrMapOvr>
+    <a:masterClrMapping/>
+  </p:clrMapOvr>
+  <p:timing>
+    <p:tnLst>
+      <p:par>
+        <p:cTn id="1" dur="indefinite" restart="never" nodeType="tmRoot"/>
+      </p:par>
+    </p:tnLst>
+  </p:timing>
+</p:sld>
+</file>
+
+<file path=ppt/slides/slide9.xml><?xml version="1.0" encoding="utf-8"?>
+<p:sld xmlns:a="http://schemas.openxmlformats.org/drawingml/2006/main" xmlns:r="http://schemas.openxmlformats.org/officeDocument/2006/relationships" xmlns:p="http://schemas.openxmlformats.org/presentationml/2006/main">
+  <p:cSld>
+    <p:spTree>
+      <p:nvGrpSpPr>
+        <p:cNvPr id="1" name=""/>
+        <p:cNvGrpSpPr/>
+        <p:nvPr/>
+      </p:nvGrpSpPr>
+      <p:grpSpPr>
+        <a:xfrm>
+          <a:off x="0" y="0"/>
+          <a:ext cx="0" cy="0"/>
+          <a:chOff x="0" y="0"/>
+          <a:chExt cx="0" cy="0"/>
+        </a:xfrm>
+      </p:grpSpPr>
+      <p:pic>
+        <p:nvPicPr>
+          <p:cNvPr id="4" name="Picture 3"/>
+          <p:cNvPicPr>
+            <a:picLocks noChangeAspect="1"/>
+          </p:cNvPicPr>
+          <p:nvPr/>
+        </p:nvPicPr>
+        <p:blipFill>
+          <a:blip r:embed="rId3">
+            <a:extLst>
+              <a:ext uri="{28A0092B-C50C-407E-A947-70E740481C1C}">
+                <a14:useLocalDpi xmlns:a14="http://schemas.microsoft.com/office/drawing/2010/main" val="0"/>
+              </a:ext>
+            </a:extLst>
+          </a:blip>
+          <a:stretch>
+            <a:fillRect/>
+          </a:stretch>
+        </p:blipFill>
+        <p:spPr>
+          <a:xfrm>
+            <a:off x="1983598" y="2942923"/>
+            <a:ext cx="5180402" cy="3410431"/>
+          </a:xfrm>
+          <a:prstGeom prst="rect">
+            <a:avLst/>
+          </a:prstGeom>
+        </p:spPr>
+      </p:pic>
+      <p:sp>
+        <p:nvSpPr>
+          <p:cNvPr id="2" name="标题 1"/>
+          <p:cNvSpPr>
+            <a:spLocks noGrp="1"/>
+          </p:cNvSpPr>
+          <p:nvPr>
+            <p:ph type="title"/>
+          </p:nvPr>
+        </p:nvSpPr>
+        <p:spPr/>
+        <p:txBody>
+          <a:bodyPr/>
+          <a:lstStyle/>
+          <a:p>
+            <a:r>
+              <a:rPr lang="en-SG" altLang="zh-SG" dirty="0" smtClean="0"/>
+              <a:t>Communications</a:t>
+            </a:r>
+            <a:endParaRPr lang="zh-SG" altLang="en-US" dirty="0"/>
+          </a:p>
+        </p:txBody>
+      </p:sp>
+      <p:sp>
+        <p:nvSpPr>
+          <p:cNvPr id="5" name="内容占位符 4"/>
+          <p:cNvSpPr>
+            <a:spLocks noGrp="1"/>
+          </p:cNvSpPr>
+          <p:nvPr>
+            <p:ph idx="1"/>
+          </p:nvPr>
+        </p:nvSpPr>
+        <p:spPr>
+          <a:xfrm>
+            <a:off x="507597" y="2296799"/>
+            <a:ext cx="7524003" cy="1091323"/>
+          </a:xfrm>
+        </p:spPr>
+        <p:txBody>
+          <a:bodyPr/>
+          <a:lstStyle/>
+          <a:p>
+            <a:r>
+              <a:rPr lang="en-SG" altLang="zh-SG" dirty="0" smtClean="0"/>
+              <a:t>Interruptions</a:t>
+            </a:r>
+            <a:endParaRPr lang="en-SG" altLang="zh-SG" dirty="0"/>
+          </a:p>
+          <a:p>
+            <a:pPr marL="0" indent="0">
+              <a:buNone/>
+            </a:pPr>
+            <a:endParaRPr lang="en-US" altLang="zh-SG" dirty="0" smtClean="0"/>
+          </a:p>
+        </p:txBody>
+      </p:sp>
+      <p:sp>
+        <p:nvSpPr>
+          <p:cNvPr id="6" name="文本框 8"/>
+          <p:cNvSpPr txBox="1"/>
+          <p:nvPr/>
+        </p:nvSpPr>
+        <p:spPr>
+          <a:xfrm>
+            <a:off x="3422319" y="6627168"/>
+            <a:ext cx="5775940" cy="230832"/>
+          </a:xfrm>
+          <a:prstGeom prst="rect">
+            <a:avLst/>
+          </a:prstGeom>
+          <a:noFill/>
+        </p:spPr>
+        <p:txBody>
+          <a:bodyPr wrap="none" rtlCol="0">
+            <a:spAutoFit/>
+          </a:bodyPr>
+          <a:lstStyle/>
+          <a:p>
+            <a:r>
+              <a:rPr lang="en-US" altLang="zh-SG" sz="900" dirty="0" smtClean="0"/>
+              <a:t>*Source </a:t>
+            </a:r>
+            <a:r>
+              <a:rPr lang="en-US" altLang="zh-SG" sz="900" dirty="0"/>
+              <a:t>: http://cals.arizona.edu/clubs/manrrs/MANRRS%20Web/GENERAL%20INTERVIEW%20TIPS.pdf</a:t>
+            </a:r>
+            <a:endParaRPr lang="zh-SG" altLang="en-US" sz="900" dirty="0"/>
+          </a:p>
+        </p:txBody>
+      </p:sp>
+      <p:sp>
+        <p:nvSpPr>
+          <p:cNvPr id="7" name="文本框 8"/>
+          <p:cNvSpPr txBox="1"/>
+          <p:nvPr/>
+        </p:nvSpPr>
+        <p:spPr>
+          <a:xfrm>
+            <a:off x="4269598" y="6353354"/>
+            <a:ext cx="3018775" cy="230832"/>
+          </a:xfrm>
+          <a:prstGeom prst="rect">
+            <a:avLst/>
+          </a:prstGeom>
+          <a:noFill/>
+        </p:spPr>
+        <p:txBody>
+          <a:bodyPr wrap="none" rtlCol="0">
+            <a:spAutoFit/>
+          </a:bodyPr>
+          <a:lstStyle/>
+          <a:p>
+            <a:r>
+              <a:rPr lang="en-US" altLang="zh-SG" sz="900" dirty="0" smtClean="0"/>
+              <a:t>Photo by: Kurt </a:t>
+            </a:r>
+            <a:r>
+              <a:rPr lang="en-US" altLang="zh-SG" sz="900" dirty="0" err="1" smtClean="0"/>
+              <a:t>Bauschardt</a:t>
+            </a:r>
+            <a:r>
+              <a:rPr lang="en-US" altLang="zh-SG" sz="900" dirty="0" smtClean="0"/>
+              <a:t>, </a:t>
+            </a:r>
+            <a:r>
+              <a:rPr lang="en-US" altLang="zh-SG" sz="900" dirty="0"/>
+              <a:t>https://flic.kr/p/kcc2QD</a:t>
+            </a:r>
+            <a:endParaRPr lang="zh-SG" altLang="en-US" sz="900" dirty="0"/>
+          </a:p>
+        </p:txBody>
+      </p:sp>
+    </p:spTree>
+    <p:extLst>
+      <p:ext uri="{BB962C8B-B14F-4D97-AF65-F5344CB8AC3E}">
+        <p14:creationId xmlns:p14="http://schemas.microsoft.com/office/powerpoint/2010/main" val="693448201"/>
+      </p:ext>
+    </p:extLst>
+  </p:cSld>
+  <p:clrMapOvr>
+    <a:masterClrMapping/>
+  </p:clrMapOvr>
+  <p:timing>
+    <p:tnLst>
+      <p:par>
+        <p:cTn id="1" dur="indefinite" restart="never" nodeType="tmRoot"/>
+      </p:par>
+    </p:tnLst>
+  </p:timing>
 </p:sld>
 </file>
 

</xml_diff>